<commit_message>
Deploy hylandtechoutreach/web-201 to github.com/hylandtechoutreach/web-201.git:gh-pages
</commit_message>
<xml_diff>
--- a/FullStackOverview/FullStackOverview.pptx
+++ b/FullStackOverview/FullStackOverview.pptx
@@ -221,7 +221,7 @@
           <a:p>
             <a:fld id="{19104133-B5B0-4351-8158-4F0E5EB1E2BF}" type="datetimeFigureOut">
               <a:rPr lang="en-US" smtClean="0"/>
-              <a:t>12/2/2019</a:t>
+              <a:t>1/10/2020</a:t>
             </a:fld>
             <a:endParaRPr lang="en-US"/>
           </a:p>
@@ -931,8 +931,17 @@
             </a:r>
             <a:r>
               <a:rPr lang="en-US" b="0" baseline="0" dirty="0" smtClean="0"/>
-              <a:t> stores, processes, and delivers webpages to clients.</a:t>
+              <a:t> stores, processes, and delivers webpages to </a:t>
             </a:r>
+            <a:r>
+              <a:rPr lang="en-US" b="0" baseline="0" smtClean="0"/>
+              <a:t>clients</a:t>
+            </a:r>
+            <a:r>
+              <a:rPr lang="en-US" b="0" baseline="0" smtClean="0"/>
+              <a:t>.</a:t>
+            </a:r>
+            <a:endParaRPr lang="en-US" b="0" baseline="0" dirty="0" smtClean="0"/>
           </a:p>
           <a:p>
             <a:r>
@@ -1319,6 +1328,90 @@
     <p:extLst>
       <p:ext uri="{BB962C8B-B14F-4D97-AF65-F5344CB8AC3E}">
         <p14:creationId xmlns:p14="http://schemas.microsoft.com/office/powerpoint/2010/main" val="1751035789"/>
+      </p:ext>
+    </p:extLst>
+  </p:cSld>
+  <p:clrMapOvr>
+    <a:masterClrMapping/>
+  </p:clrMapOvr>
+</p:notes>
+</file>
+
+<file path=ppt/notesSlides/notesSlide9.xml><?xml version="1.0" encoding="utf-8"?>
+<p:notes xmlns:a="http://schemas.openxmlformats.org/drawingml/2006/main" xmlns:r="http://schemas.openxmlformats.org/officeDocument/2006/relationships" xmlns:p="http://schemas.openxmlformats.org/presentationml/2006/main">
+  <p:cSld>
+    <p:spTree>
+      <p:nvGrpSpPr>
+        <p:cNvPr id="1" name=""/>
+        <p:cNvGrpSpPr/>
+        <p:nvPr/>
+      </p:nvGrpSpPr>
+      <p:grpSpPr>
+        <a:xfrm>
+          <a:off x="0" y="0"/>
+          <a:ext cx="0" cy="0"/>
+          <a:chOff x="0" y="0"/>
+          <a:chExt cx="0" cy="0"/>
+        </a:xfrm>
+      </p:grpSpPr>
+      <p:sp>
+        <p:nvSpPr>
+          <p:cNvPr id="2" name="Slide Image Placeholder 1"/>
+          <p:cNvSpPr>
+            <a:spLocks noGrp="1" noRot="1" noChangeAspect="1"/>
+          </p:cNvSpPr>
+          <p:nvPr>
+            <p:ph type="sldImg"/>
+          </p:nvPr>
+        </p:nvSpPr>
+        <p:spPr/>
+      </p:sp>
+      <p:sp>
+        <p:nvSpPr>
+          <p:cNvPr id="3" name="Notes Placeholder 2"/>
+          <p:cNvSpPr>
+            <a:spLocks noGrp="1"/>
+          </p:cNvSpPr>
+          <p:nvPr>
+            <p:ph type="body" idx="1"/>
+          </p:nvPr>
+        </p:nvSpPr>
+        <p:spPr/>
+        <p:txBody>
+          <a:bodyPr/>
+          <a:lstStyle/>
+          <a:p>
+            <a:endParaRPr lang="en-US" dirty="0"/>
+          </a:p>
+        </p:txBody>
+      </p:sp>
+      <p:sp>
+        <p:nvSpPr>
+          <p:cNvPr id="4" name="Slide Number Placeholder 3"/>
+          <p:cNvSpPr>
+            <a:spLocks noGrp="1"/>
+          </p:cNvSpPr>
+          <p:nvPr>
+            <p:ph type="sldNum" sz="quarter" idx="10"/>
+          </p:nvPr>
+        </p:nvSpPr>
+        <p:spPr/>
+        <p:txBody>
+          <a:bodyPr/>
+          <a:lstStyle/>
+          <a:p>
+            <a:fld id="{DEC8F7F9-57EC-49CF-9FCD-2B781E4B449F}" type="slidenum">
+              <a:rPr lang="en-US" smtClean="0"/>
+              <a:t>14</a:t>
+            </a:fld>
+            <a:endParaRPr lang="en-US"/>
+          </a:p>
+        </p:txBody>
+      </p:sp>
+    </p:spTree>
+    <p:extLst>
+      <p:ext uri="{BB962C8B-B14F-4D97-AF65-F5344CB8AC3E}">
+        <p14:creationId xmlns:p14="http://schemas.microsoft.com/office/powerpoint/2010/main" val="1309092979"/>
       </p:ext>
     </p:extLst>
   </p:cSld>
@@ -1518,7 +1611,7 @@
             <a:fld id="{1C2D31DE-C454-491C-B5C3-F097855E3DF7}" type="datetime4">
               <a:rPr lang="en-US" smtClean="0"/>
               <a:pPr/>
-              <a:t>December 2, 2019</a:t>
+              <a:t>January 10, 2020</a:t>
             </a:fld>
             <a:endParaRPr lang="en-US" dirty="0"/>
           </a:p>
@@ -4918,7 +5011,7 @@
           <a:p>
             <a:fld id="{5958763E-B898-436D-883D-03711491D54A}" type="datetimeFigureOut">
               <a:rPr lang="en-US" smtClean="0"/>
-              <a:t>12/2/2019</a:t>
+              <a:t>1/10/2020</a:t>
             </a:fld>
             <a:endParaRPr lang="en-US"/>
           </a:p>
@@ -5119,7 +5212,7 @@
           <a:p>
             <a:fld id="{5958763E-B898-436D-883D-03711491D54A}" type="datetimeFigureOut">
               <a:rPr lang="en-US" smtClean="0"/>
-              <a:t>12/2/2019</a:t>
+              <a:t>1/10/2020</a:t>
             </a:fld>
             <a:endParaRPr lang="en-US"/>
           </a:p>
@@ -5376,7 +5469,7 @@
           <a:p>
             <a:fld id="{5958763E-B898-436D-883D-03711491D54A}" type="datetimeFigureOut">
               <a:rPr lang="en-US" smtClean="0"/>
-              <a:t>12/2/2019</a:t>
+              <a:t>1/10/2020</a:t>
             </a:fld>
             <a:endParaRPr lang="en-US"/>
           </a:p>
@@ -5731,7 +5824,7 @@
           <a:p>
             <a:fld id="{5958763E-B898-436D-883D-03711491D54A}" type="datetimeFigureOut">
               <a:rPr lang="en-US" smtClean="0"/>
-              <a:t>12/2/2019</a:t>
+              <a:t>1/10/2020</a:t>
             </a:fld>
             <a:endParaRPr lang="en-US"/>
           </a:p>
@@ -6154,7 +6247,7 @@
           <a:p>
             <a:fld id="{5958763E-B898-436D-883D-03711491D54A}" type="datetimeFigureOut">
               <a:rPr lang="en-US" smtClean="0"/>
-              <a:t>12/2/2019</a:t>
+              <a:t>1/10/2020</a:t>
             </a:fld>
             <a:endParaRPr lang="en-US"/>
           </a:p>
@@ -6662,7 +6755,7 @@
           <a:p>
             <a:fld id="{5958763E-B898-436D-883D-03711491D54A}" type="datetimeFigureOut">
               <a:rPr lang="en-US" smtClean="0"/>
-              <a:t>12/2/2019</a:t>
+              <a:t>1/10/2020</a:t>
             </a:fld>
             <a:endParaRPr lang="en-US"/>
           </a:p>
@@ -7120,7 +7213,7 @@
           <a:p>
             <a:fld id="{5958763E-B898-436D-883D-03711491D54A}" type="datetimeFigureOut">
               <a:rPr lang="en-US" smtClean="0"/>
-              <a:t>12/2/2019</a:t>
+              <a:t>1/10/2020</a:t>
             </a:fld>
             <a:endParaRPr lang="en-US"/>
           </a:p>
@@ -7738,7 +7831,7 @@
           <a:p>
             <a:fld id="{5958763E-B898-436D-883D-03711491D54A}" type="datetimeFigureOut">
               <a:rPr lang="en-US" smtClean="0"/>
-              <a:t>12/2/2019</a:t>
+              <a:t>1/10/2020</a:t>
             </a:fld>
             <a:endParaRPr lang="en-US"/>
           </a:p>
@@ -8516,7 +8609,7 @@
           <a:p>
             <a:fld id="{5958763E-B898-436D-883D-03711491D54A}" type="datetimeFigureOut">
               <a:rPr lang="en-US" smtClean="0"/>
-              <a:t>12/2/2019</a:t>
+              <a:t>1/10/2020</a:t>
             </a:fld>
             <a:endParaRPr lang="en-US"/>
           </a:p>
@@ -8627,7 +8720,7 @@
           <a:p>
             <a:fld id="{5958763E-B898-436D-883D-03711491D54A}" type="datetimeFigureOut">
               <a:rPr lang="en-US" smtClean="0"/>
-              <a:t>12/2/2019</a:t>
+              <a:t>1/10/2020</a:t>
             </a:fld>
             <a:endParaRPr lang="en-US"/>
           </a:p>
@@ -8969,7 +9062,7 @@
             <a:fld id="{1C2D31DE-C454-491C-B5C3-F097855E3DF7}" type="datetime4">
               <a:rPr lang="en-US" smtClean="0"/>
               <a:pPr/>
-              <a:t>December 2, 2019</a:t>
+              <a:t>January 10, 2020</a:t>
             </a:fld>
             <a:endParaRPr lang="en-US" dirty="0"/>
           </a:p>
@@ -12129,7 +12222,7 @@
           <a:p>
             <a:fld id="{5958763E-B898-436D-883D-03711491D54A}" type="datetimeFigureOut">
               <a:rPr lang="en-US" smtClean="0"/>
-              <a:t>12/2/2019</a:t>
+              <a:t>1/10/2020</a:t>
             </a:fld>
             <a:endParaRPr lang="en-US"/>
           </a:p>
@@ -12260,7 +12353,7 @@
           <a:p>
             <a:fld id="{5958763E-B898-436D-883D-03711491D54A}" type="datetimeFigureOut">
               <a:rPr lang="en-US" smtClean="0"/>
-              <a:t>12/2/2019</a:t>
+              <a:t>1/10/2020</a:t>
             </a:fld>
             <a:endParaRPr lang="en-US"/>
           </a:p>
@@ -12391,7 +12484,7 @@
           <a:p>
             <a:fld id="{5958763E-B898-436D-883D-03711491D54A}" type="datetimeFigureOut">
               <a:rPr lang="en-US" smtClean="0"/>
-              <a:t>12/2/2019</a:t>
+              <a:t>1/10/2020</a:t>
             </a:fld>
             <a:endParaRPr lang="en-US"/>
           </a:p>
@@ -12522,7 +12615,7 @@
           <a:p>
             <a:fld id="{5958763E-B898-436D-883D-03711491D54A}" type="datetimeFigureOut">
               <a:rPr lang="en-US" smtClean="0"/>
-              <a:t>12/2/2019</a:t>
+              <a:t>1/10/2020</a:t>
             </a:fld>
             <a:endParaRPr lang="en-US"/>
           </a:p>
@@ -12653,7 +12746,7 @@
           <a:p>
             <a:fld id="{5958763E-B898-436D-883D-03711491D54A}" type="datetimeFigureOut">
               <a:rPr lang="en-US" smtClean="0"/>
-              <a:t>12/2/2019</a:t>
+              <a:t>1/10/2020</a:t>
             </a:fld>
             <a:endParaRPr lang="en-US"/>
           </a:p>
@@ -12784,7 +12877,7 @@
           <a:p>
             <a:fld id="{5958763E-B898-436D-883D-03711491D54A}" type="datetimeFigureOut">
               <a:rPr lang="en-US" smtClean="0"/>
-              <a:t>12/2/2019</a:t>
+              <a:t>1/10/2020</a:t>
             </a:fld>
             <a:endParaRPr lang="en-US"/>
           </a:p>
@@ -12915,7 +13008,7 @@
           <a:p>
             <a:fld id="{5958763E-B898-436D-883D-03711491D54A}" type="datetimeFigureOut">
               <a:rPr lang="en-US" smtClean="0"/>
-              <a:t>12/2/2019</a:t>
+              <a:t>1/10/2020</a:t>
             </a:fld>
             <a:endParaRPr lang="en-US"/>
           </a:p>
@@ -13046,7 +13139,7 @@
           <a:p>
             <a:fld id="{5958763E-B898-436D-883D-03711491D54A}" type="datetimeFigureOut">
               <a:rPr lang="en-US" smtClean="0"/>
-              <a:t>12/2/2019</a:t>
+              <a:t>1/10/2020</a:t>
             </a:fld>
             <a:endParaRPr lang="en-US"/>
           </a:p>
@@ -13186,7 +13279,7 @@
           <a:p>
             <a:fld id="{5958763E-B898-436D-883D-03711491D54A}" type="datetimeFigureOut">
               <a:rPr lang="en-US" smtClean="0"/>
-              <a:t>12/2/2019</a:t>
+              <a:t>1/10/2020</a:t>
             </a:fld>
             <a:endParaRPr lang="en-US"/>
           </a:p>
@@ -16547,7 +16640,7 @@
             <a:fld id="{1C2D31DE-C454-491C-B5C3-F097855E3DF7}" type="datetime4">
               <a:rPr lang="en-US" smtClean="0"/>
               <a:pPr/>
-              <a:t>December 2, 2019</a:t>
+              <a:t>January 10, 2020</a:t>
             </a:fld>
             <a:endParaRPr lang="en-US" dirty="0"/>
           </a:p>
@@ -28792,7 +28885,7 @@
           <a:p>
             <a:fld id="{5958763E-B898-436D-883D-03711491D54A}" type="datetimeFigureOut">
               <a:rPr lang="en-US" smtClean="0"/>
-              <a:t>12/2/2019</a:t>
+              <a:t>1/10/2020</a:t>
             </a:fld>
             <a:endParaRPr lang="en-US"/>
           </a:p>
@@ -29201,7 +29294,7 @@
           <a:p>
             <a:fld id="{5958763E-B898-436D-883D-03711491D54A}" type="datetimeFigureOut">
               <a:rPr lang="en-US" smtClean="0"/>
-              <a:t>12/2/2019</a:t>
+              <a:t>1/10/2020</a:t>
             </a:fld>
             <a:endParaRPr lang="en-US"/>
           </a:p>
@@ -29502,7 +29595,7 @@
           <a:p>
             <a:fld id="{5958763E-B898-436D-883D-03711491D54A}" type="datetimeFigureOut">
               <a:rPr lang="en-US" smtClean="0"/>
-              <a:t>12/2/2019</a:t>
+              <a:t>1/10/2020</a:t>
             </a:fld>
             <a:endParaRPr lang="en-US"/>
           </a:p>
@@ -29710,7 +29803,7 @@
           <a:p>
             <a:fld id="{5958763E-B898-436D-883D-03711491D54A}" type="datetimeFigureOut">
               <a:rPr lang="en-US" smtClean="0"/>
-              <a:t>12/2/2019</a:t>
+              <a:t>1/10/2020</a:t>
             </a:fld>
             <a:endParaRPr lang="en-US"/>
           </a:p>
@@ -29978,7 +30071,7 @@
           <a:p>
             <a:fld id="{5958763E-B898-436D-883D-03711491D54A}" type="datetimeFigureOut">
               <a:rPr lang="en-US" smtClean="0"/>
-              <a:t>12/2/2019</a:t>
+              <a:t>1/10/2020</a:t>
             </a:fld>
             <a:endParaRPr lang="en-US"/>
           </a:p>
@@ -30495,7 +30588,7 @@
           <a:p>
             <a:fld id="{5958763E-B898-436D-883D-03711491D54A}" type="datetimeFigureOut">
               <a:rPr lang="en-US" smtClean="0"/>
-              <a:t>12/2/2019</a:t>
+              <a:t>1/10/2020</a:t>
             </a:fld>
             <a:endParaRPr lang="en-US"/>
           </a:p>
@@ -30983,7 +31076,7 @@
           <a:p>
             <a:fld id="{5958763E-B898-436D-883D-03711491D54A}" type="datetimeFigureOut">
               <a:rPr lang="en-US" smtClean="0"/>
-              <a:t>12/2/2019</a:t>
+              <a:t>1/10/2020</a:t>
             </a:fld>
             <a:endParaRPr lang="en-US"/>
           </a:p>
@@ -31809,7 +31902,7 @@
           <a:p>
             <a:fld id="{5958763E-B898-436D-883D-03711491D54A}" type="datetimeFigureOut">
               <a:rPr lang="en-US" smtClean="0"/>
-              <a:t>12/2/2019</a:t>
+              <a:t>1/10/2020</a:t>
             </a:fld>
             <a:endParaRPr lang="en-US"/>
           </a:p>
@@ -32017,7 +32110,7 @@
           <a:p>
             <a:fld id="{5958763E-B898-436D-883D-03711491D54A}" type="datetimeFigureOut">
               <a:rPr lang="en-US" smtClean="0"/>
-              <a:t>12/2/2019</a:t>
+              <a:t>1/10/2020</a:t>
             </a:fld>
             <a:endParaRPr lang="en-US"/>
           </a:p>
@@ -32359,7 +32452,7 @@
           <a:p>
             <a:fld id="{5958763E-B898-436D-883D-03711491D54A}" type="datetimeFigureOut">
               <a:rPr lang="en-US" smtClean="0"/>
-              <a:t>12/2/2019</a:t>
+              <a:t>1/10/2020</a:t>
             </a:fld>
             <a:endParaRPr lang="en-US"/>
           </a:p>
@@ -32596,7 +32689,7 @@
           <a:p>
             <a:fld id="{5958763E-B898-436D-883D-03711491D54A}" type="datetimeFigureOut">
               <a:rPr lang="en-US" smtClean="0"/>
-              <a:t>12/2/2019</a:t>
+              <a:t>1/10/2020</a:t>
             </a:fld>
             <a:endParaRPr lang="en-US"/>
           </a:p>
@@ -32847,7 +32940,7 @@
           <a:p>
             <a:fld id="{5958763E-B898-436D-883D-03711491D54A}" type="datetimeFigureOut">
               <a:rPr lang="en-US" smtClean="0"/>
-              <a:t>12/2/2019</a:t>
+              <a:t>1/10/2020</a:t>
             </a:fld>
             <a:endParaRPr lang="en-US"/>
           </a:p>
@@ -36692,11 +36785,6 @@
               </a:rPr>
               <a:t>Join Date </a:t>
             </a:r>
-            <a:endParaRPr lang="en-US" sz="4400" dirty="0" smtClean="0">
-              <a:solidFill>
-                <a:schemeClr val="accent1"/>
-              </a:solidFill>
-            </a:endParaRPr>
           </a:p>
         </p:txBody>
       </p:sp>
@@ -36882,11 +36970,7 @@
           <a:p>
             <a:r>
               <a:rPr lang="en-US" dirty="0" smtClean="0"/>
-              <a:t>Back-end </a:t>
-            </a:r>
-            <a:r>
-              <a:rPr lang="en-US" dirty="0" smtClean="0"/>
-              <a:t>– Data Transfer</a:t>
+              <a:t>Back-end – Data Transfer</a:t>
             </a:r>
             <a:endParaRPr lang="en-US" dirty="0"/>
           </a:p>
@@ -36924,11 +37008,7 @@
             </a:r>
             <a:r>
               <a:rPr lang="en-US" sz="3200" dirty="0" err="1" smtClean="0"/>
-              <a:t>yp</a:t>
-            </a:r>
-            <a:r>
-              <a:rPr lang="en-US" sz="3200" dirty="0" err="1" smtClean="0"/>
-              <a:t>er</a:t>
+              <a:t>yper</a:t>
             </a:r>
             <a:r>
               <a:rPr lang="en-US" sz="3200" b="1" dirty="0" err="1"/>
@@ -36958,7 +37038,6 @@
               <a:rPr lang="en-US" sz="3200" dirty="0" smtClean="0"/>
               <a:t>rotocol</a:t>
             </a:r>
-            <a:endParaRPr lang="en-US" sz="3200" dirty="0" smtClean="0"/>
           </a:p>
           <a:p>
             <a:endParaRPr lang="en-US" sz="3200" dirty="0" smtClean="0"/>
@@ -36977,7 +37056,6 @@
               <a:rPr lang="en-US" sz="3200" dirty="0" smtClean="0"/>
               <a:t>If the front-end wants to update data, the server will update the database as needed</a:t>
             </a:r>
-            <a:endParaRPr lang="en-US" sz="3200" dirty="0" smtClean="0"/>
           </a:p>
         </p:txBody>
       </p:sp>
@@ -37148,15 +37226,7 @@
           <a:p>
             <a:r>
               <a:rPr lang="en-US" dirty="0" smtClean="0"/>
-              <a:t>Full-stack </a:t>
-            </a:r>
-            <a:r>
-              <a:rPr lang="en-US" dirty="0" smtClean="0"/>
-              <a:t>– </a:t>
-            </a:r>
-            <a:r>
-              <a:rPr lang="en-US" dirty="0" smtClean="0"/>
-              <a:t>Everything</a:t>
+              <a:t>Full-stack – Everything</a:t>
             </a:r>
             <a:endParaRPr lang="en-US" dirty="0"/>
           </a:p>
@@ -38235,7 +38305,7 @@
           <p:nvPr/>
         </p:nvPicPr>
         <p:blipFill>
-          <a:blip r:embed="rId2" cstate="hqprint">
+          <a:blip r:embed="rId3" cstate="hqprint">
             <a:extLst>
               <a:ext uri="{28A0092B-C50C-407E-A947-70E740481C1C}">
                 <a14:useLocalDpi xmlns:a14="http://schemas.microsoft.com/office/drawing/2010/main" val="0"/>
@@ -38276,7 +38346,7 @@
           <p:nvPr/>
         </p:nvPicPr>
         <p:blipFill>
-          <a:blip r:embed="rId3" cstate="hqprint">
+          <a:blip r:embed="rId4" cstate="hqprint">
             <a:extLst>
               <a:ext uri="{28A0092B-C50C-407E-A947-70E740481C1C}">
                 <a14:useLocalDpi xmlns:a14="http://schemas.microsoft.com/office/drawing/2010/main" val="0"/>
@@ -38317,7 +38387,7 @@
           <p:nvPr/>
         </p:nvPicPr>
         <p:blipFill>
-          <a:blip r:embed="rId4" cstate="hqprint">
+          <a:blip r:embed="rId5" cstate="hqprint">
             <a:extLst>
               <a:ext uri="{28A0092B-C50C-407E-A947-70E740481C1C}">
                 <a14:useLocalDpi xmlns:a14="http://schemas.microsoft.com/office/drawing/2010/main" val="0"/>
@@ -39523,15 +39593,7 @@
             </a:r>
             <a:r>
               <a:rPr lang="en-US" dirty="0" smtClean="0"/>
-              <a:t> the </a:t>
-            </a:r>
-            <a:r>
-              <a:rPr lang="en-US" dirty="0" smtClean="0"/>
-              <a:t>back-end </a:t>
-            </a:r>
-            <a:r>
-              <a:rPr lang="en-US" dirty="0" smtClean="0"/>
-              <a:t>and uses it to show the information </a:t>
+              <a:t> the back-end and uses it to show the information </a:t>
             </a:r>
             <a:r>
               <a:rPr lang="en-US" i="1" dirty="0" smtClean="0"/>
@@ -40780,15 +40842,7 @@
             </a:r>
             <a:r>
               <a:rPr lang="en-US" dirty="0" smtClean="0"/>
-              <a:t> the </a:t>
-            </a:r>
-            <a:r>
-              <a:rPr lang="en-US" dirty="0" smtClean="0"/>
-              <a:t>back-end </a:t>
-            </a:r>
-            <a:r>
-              <a:rPr lang="en-US" dirty="0" smtClean="0"/>
-              <a:t>to update it</a:t>
+              <a:t> the back-end to update it</a:t>
             </a:r>
           </a:p>
           <a:p>
@@ -41938,10 +41992,6 @@
               <a:rPr lang="en-US" dirty="0" smtClean="0"/>
               <a:t>Back-end</a:t>
             </a:r>
-            <a:r>
-              <a:rPr lang="en-US" dirty="0" smtClean="0"/>
-              <a:t/>
-            </a:r>
             <a:br>
               <a:rPr lang="en-US" dirty="0" smtClean="0"/>
             </a:br>
@@ -42087,15 +42137,7 @@
             </a:r>
             <a:r>
               <a:rPr lang="en-US" dirty="0" smtClean="0"/>
-              <a:t> </a:t>
-            </a:r>
-            <a:r>
-              <a:rPr lang="en-US" dirty="0" smtClean="0"/>
-              <a:t>of a web application is </a:t>
-            </a:r>
-            <a:r>
-              <a:rPr lang="en-US" dirty="0" smtClean="0"/>
-              <a:t>the engine that runs the website</a:t>
+              <a:t> of a web application is the engine that runs the website</a:t>
             </a:r>
           </a:p>
           <a:p>
@@ -42103,7 +42145,6 @@
               <a:rPr lang="en-US" dirty="0" smtClean="0"/>
               <a:t>It processes requests from the front-end, and holds data for the app</a:t>
             </a:r>
-            <a:endParaRPr lang="en-US" dirty="0" smtClean="0"/>
           </a:p>
         </p:txBody>
       </p:sp>
@@ -42192,19 +42233,6 @@
               </a:rPr>
               <a:t>Database</a:t>
             </a:r>
-            <a:endParaRPr lang="en-US" sz="2400" dirty="0" smtClean="0">
-              <a:gradFill>
-                <a:gsLst>
-                  <a:gs pos="2917">
-                    <a:schemeClr val="tx1"/>
-                  </a:gs>
-                  <a:gs pos="30000">
-                    <a:schemeClr val="tx1"/>
-                  </a:gs>
-                </a:gsLst>
-                <a:lin ang="5400000" scaled="0"/>
-              </a:gradFill>
-            </a:endParaRPr>
           </a:p>
         </p:txBody>
       </p:sp>
@@ -42334,19 +42362,6 @@
               </a:rPr>
               <a:t>Server</a:t>
             </a:r>
-            <a:endParaRPr lang="en-US" sz="2400" dirty="0" smtClean="0">
-              <a:gradFill>
-                <a:gsLst>
-                  <a:gs pos="2917">
-                    <a:schemeClr val="tx1"/>
-                  </a:gs>
-                  <a:gs pos="30000">
-                    <a:schemeClr val="tx1"/>
-                  </a:gs>
-                </a:gsLst>
-                <a:lin ang="5400000" scaled="0"/>
-              </a:gradFill>
-            </a:endParaRPr>
           </a:p>
         </p:txBody>
       </p:sp>

</xml_diff>

<commit_message>
full stack overview ppt update
</commit_message>
<xml_diff>
--- a/FullStackOverview/FullStackOverview.pptx
+++ b/FullStackOverview/FullStackOverview.pptx
@@ -221,7 +221,7 @@
           <a:p>
             <a:fld id="{19104133-B5B0-4351-8158-4F0E5EB1E2BF}" type="datetimeFigureOut">
               <a:rPr lang="en-US" smtClean="0"/>
-              <a:t>1/10/2020</a:t>
+              <a:t>5/4/2020</a:t>
             </a:fld>
             <a:endParaRPr lang="en-US"/>
           </a:p>
@@ -935,11 +935,7 @@
             </a:r>
             <a:r>
               <a:rPr lang="en-US" b="0" baseline="0" smtClean="0"/>
-              <a:t>clients</a:t>
-            </a:r>
-            <a:r>
-              <a:rPr lang="en-US" b="0" baseline="0" smtClean="0"/>
-              <a:t>.</a:t>
+              <a:t>clients.</a:t>
             </a:r>
             <a:endParaRPr lang="en-US" b="0" baseline="0" dirty="0" smtClean="0"/>
           </a:p>
@@ -1611,7 +1607,7 @@
             <a:fld id="{1C2D31DE-C454-491C-B5C3-F097855E3DF7}" type="datetime4">
               <a:rPr lang="en-US" smtClean="0"/>
               <a:pPr/>
-              <a:t>January 10, 2020</a:t>
+              <a:t>May 4, 2020</a:t>
             </a:fld>
             <a:endParaRPr lang="en-US" dirty="0"/>
           </a:p>
@@ -5011,7 +5007,7 @@
           <a:p>
             <a:fld id="{5958763E-B898-436D-883D-03711491D54A}" type="datetimeFigureOut">
               <a:rPr lang="en-US" smtClean="0"/>
-              <a:t>1/10/2020</a:t>
+              <a:t>5/4/2020</a:t>
             </a:fld>
             <a:endParaRPr lang="en-US"/>
           </a:p>
@@ -5212,7 +5208,7 @@
           <a:p>
             <a:fld id="{5958763E-B898-436D-883D-03711491D54A}" type="datetimeFigureOut">
               <a:rPr lang="en-US" smtClean="0"/>
-              <a:t>1/10/2020</a:t>
+              <a:t>5/4/2020</a:t>
             </a:fld>
             <a:endParaRPr lang="en-US"/>
           </a:p>
@@ -5469,7 +5465,7 @@
           <a:p>
             <a:fld id="{5958763E-B898-436D-883D-03711491D54A}" type="datetimeFigureOut">
               <a:rPr lang="en-US" smtClean="0"/>
-              <a:t>1/10/2020</a:t>
+              <a:t>5/4/2020</a:t>
             </a:fld>
             <a:endParaRPr lang="en-US"/>
           </a:p>
@@ -5824,7 +5820,7 @@
           <a:p>
             <a:fld id="{5958763E-B898-436D-883D-03711491D54A}" type="datetimeFigureOut">
               <a:rPr lang="en-US" smtClean="0"/>
-              <a:t>1/10/2020</a:t>
+              <a:t>5/4/2020</a:t>
             </a:fld>
             <a:endParaRPr lang="en-US"/>
           </a:p>
@@ -6247,7 +6243,7 @@
           <a:p>
             <a:fld id="{5958763E-B898-436D-883D-03711491D54A}" type="datetimeFigureOut">
               <a:rPr lang="en-US" smtClean="0"/>
-              <a:t>1/10/2020</a:t>
+              <a:t>5/4/2020</a:t>
             </a:fld>
             <a:endParaRPr lang="en-US"/>
           </a:p>
@@ -6755,7 +6751,7 @@
           <a:p>
             <a:fld id="{5958763E-B898-436D-883D-03711491D54A}" type="datetimeFigureOut">
               <a:rPr lang="en-US" smtClean="0"/>
-              <a:t>1/10/2020</a:t>
+              <a:t>5/4/2020</a:t>
             </a:fld>
             <a:endParaRPr lang="en-US"/>
           </a:p>
@@ -7213,7 +7209,7 @@
           <a:p>
             <a:fld id="{5958763E-B898-436D-883D-03711491D54A}" type="datetimeFigureOut">
               <a:rPr lang="en-US" smtClean="0"/>
-              <a:t>1/10/2020</a:t>
+              <a:t>5/4/2020</a:t>
             </a:fld>
             <a:endParaRPr lang="en-US"/>
           </a:p>
@@ -7831,7 +7827,7 @@
           <a:p>
             <a:fld id="{5958763E-B898-436D-883D-03711491D54A}" type="datetimeFigureOut">
               <a:rPr lang="en-US" smtClean="0"/>
-              <a:t>1/10/2020</a:t>
+              <a:t>5/4/2020</a:t>
             </a:fld>
             <a:endParaRPr lang="en-US"/>
           </a:p>
@@ -8609,7 +8605,7 @@
           <a:p>
             <a:fld id="{5958763E-B898-436D-883D-03711491D54A}" type="datetimeFigureOut">
               <a:rPr lang="en-US" smtClean="0"/>
-              <a:t>1/10/2020</a:t>
+              <a:t>5/4/2020</a:t>
             </a:fld>
             <a:endParaRPr lang="en-US"/>
           </a:p>
@@ -8720,7 +8716,7 @@
           <a:p>
             <a:fld id="{5958763E-B898-436D-883D-03711491D54A}" type="datetimeFigureOut">
               <a:rPr lang="en-US" smtClean="0"/>
-              <a:t>1/10/2020</a:t>
+              <a:t>5/4/2020</a:t>
             </a:fld>
             <a:endParaRPr lang="en-US"/>
           </a:p>
@@ -9062,7 +9058,7 @@
             <a:fld id="{1C2D31DE-C454-491C-B5C3-F097855E3DF7}" type="datetime4">
               <a:rPr lang="en-US" smtClean="0"/>
               <a:pPr/>
-              <a:t>January 10, 2020</a:t>
+              <a:t>May 4, 2020</a:t>
             </a:fld>
             <a:endParaRPr lang="en-US" dirty="0"/>
           </a:p>
@@ -12222,7 +12218,7 @@
           <a:p>
             <a:fld id="{5958763E-B898-436D-883D-03711491D54A}" type="datetimeFigureOut">
               <a:rPr lang="en-US" smtClean="0"/>
-              <a:t>1/10/2020</a:t>
+              <a:t>5/4/2020</a:t>
             </a:fld>
             <a:endParaRPr lang="en-US"/>
           </a:p>
@@ -12353,7 +12349,7 @@
           <a:p>
             <a:fld id="{5958763E-B898-436D-883D-03711491D54A}" type="datetimeFigureOut">
               <a:rPr lang="en-US" smtClean="0"/>
-              <a:t>1/10/2020</a:t>
+              <a:t>5/4/2020</a:t>
             </a:fld>
             <a:endParaRPr lang="en-US"/>
           </a:p>
@@ -12484,7 +12480,7 @@
           <a:p>
             <a:fld id="{5958763E-B898-436D-883D-03711491D54A}" type="datetimeFigureOut">
               <a:rPr lang="en-US" smtClean="0"/>
-              <a:t>1/10/2020</a:t>
+              <a:t>5/4/2020</a:t>
             </a:fld>
             <a:endParaRPr lang="en-US"/>
           </a:p>
@@ -12615,7 +12611,7 @@
           <a:p>
             <a:fld id="{5958763E-B898-436D-883D-03711491D54A}" type="datetimeFigureOut">
               <a:rPr lang="en-US" smtClean="0"/>
-              <a:t>1/10/2020</a:t>
+              <a:t>5/4/2020</a:t>
             </a:fld>
             <a:endParaRPr lang="en-US"/>
           </a:p>
@@ -12746,7 +12742,7 @@
           <a:p>
             <a:fld id="{5958763E-B898-436D-883D-03711491D54A}" type="datetimeFigureOut">
               <a:rPr lang="en-US" smtClean="0"/>
-              <a:t>1/10/2020</a:t>
+              <a:t>5/4/2020</a:t>
             </a:fld>
             <a:endParaRPr lang="en-US"/>
           </a:p>
@@ -12877,7 +12873,7 @@
           <a:p>
             <a:fld id="{5958763E-B898-436D-883D-03711491D54A}" type="datetimeFigureOut">
               <a:rPr lang="en-US" smtClean="0"/>
-              <a:t>1/10/2020</a:t>
+              <a:t>5/4/2020</a:t>
             </a:fld>
             <a:endParaRPr lang="en-US"/>
           </a:p>
@@ -13008,7 +13004,7 @@
           <a:p>
             <a:fld id="{5958763E-B898-436D-883D-03711491D54A}" type="datetimeFigureOut">
               <a:rPr lang="en-US" smtClean="0"/>
-              <a:t>1/10/2020</a:t>
+              <a:t>5/4/2020</a:t>
             </a:fld>
             <a:endParaRPr lang="en-US"/>
           </a:p>
@@ -13139,7 +13135,7 @@
           <a:p>
             <a:fld id="{5958763E-B898-436D-883D-03711491D54A}" type="datetimeFigureOut">
               <a:rPr lang="en-US" smtClean="0"/>
-              <a:t>1/10/2020</a:t>
+              <a:t>5/4/2020</a:t>
             </a:fld>
             <a:endParaRPr lang="en-US"/>
           </a:p>
@@ -13279,7 +13275,7 @@
           <a:p>
             <a:fld id="{5958763E-B898-436D-883D-03711491D54A}" type="datetimeFigureOut">
               <a:rPr lang="en-US" smtClean="0"/>
-              <a:t>1/10/2020</a:t>
+              <a:t>5/4/2020</a:t>
             </a:fld>
             <a:endParaRPr lang="en-US"/>
           </a:p>
@@ -16640,7 +16636,7 @@
             <a:fld id="{1C2D31DE-C454-491C-B5C3-F097855E3DF7}" type="datetime4">
               <a:rPr lang="en-US" smtClean="0"/>
               <a:pPr/>
-              <a:t>January 10, 2020</a:t>
+              <a:t>May 4, 2020</a:t>
             </a:fld>
             <a:endParaRPr lang="en-US" dirty="0"/>
           </a:p>
@@ -28885,7 +28881,7 @@
           <a:p>
             <a:fld id="{5958763E-B898-436D-883D-03711491D54A}" type="datetimeFigureOut">
               <a:rPr lang="en-US" smtClean="0"/>
-              <a:t>1/10/2020</a:t>
+              <a:t>5/4/2020</a:t>
             </a:fld>
             <a:endParaRPr lang="en-US"/>
           </a:p>
@@ -29294,7 +29290,7 @@
           <a:p>
             <a:fld id="{5958763E-B898-436D-883D-03711491D54A}" type="datetimeFigureOut">
               <a:rPr lang="en-US" smtClean="0"/>
-              <a:t>1/10/2020</a:t>
+              <a:t>5/4/2020</a:t>
             </a:fld>
             <a:endParaRPr lang="en-US"/>
           </a:p>
@@ -29595,7 +29591,7 @@
           <a:p>
             <a:fld id="{5958763E-B898-436D-883D-03711491D54A}" type="datetimeFigureOut">
               <a:rPr lang="en-US" smtClean="0"/>
-              <a:t>1/10/2020</a:t>
+              <a:t>5/4/2020</a:t>
             </a:fld>
             <a:endParaRPr lang="en-US"/>
           </a:p>
@@ -29803,7 +29799,7 @@
           <a:p>
             <a:fld id="{5958763E-B898-436D-883D-03711491D54A}" type="datetimeFigureOut">
               <a:rPr lang="en-US" smtClean="0"/>
-              <a:t>1/10/2020</a:t>
+              <a:t>5/4/2020</a:t>
             </a:fld>
             <a:endParaRPr lang="en-US"/>
           </a:p>
@@ -30071,7 +30067,7 @@
           <a:p>
             <a:fld id="{5958763E-B898-436D-883D-03711491D54A}" type="datetimeFigureOut">
               <a:rPr lang="en-US" smtClean="0"/>
-              <a:t>1/10/2020</a:t>
+              <a:t>5/4/2020</a:t>
             </a:fld>
             <a:endParaRPr lang="en-US"/>
           </a:p>
@@ -30588,7 +30584,7 @@
           <a:p>
             <a:fld id="{5958763E-B898-436D-883D-03711491D54A}" type="datetimeFigureOut">
               <a:rPr lang="en-US" smtClean="0"/>
-              <a:t>1/10/2020</a:t>
+              <a:t>5/4/2020</a:t>
             </a:fld>
             <a:endParaRPr lang="en-US"/>
           </a:p>
@@ -31076,7 +31072,7 @@
           <a:p>
             <a:fld id="{5958763E-B898-436D-883D-03711491D54A}" type="datetimeFigureOut">
               <a:rPr lang="en-US" smtClean="0"/>
-              <a:t>1/10/2020</a:t>
+              <a:t>5/4/2020</a:t>
             </a:fld>
             <a:endParaRPr lang="en-US"/>
           </a:p>
@@ -31902,7 +31898,7 @@
           <a:p>
             <a:fld id="{5958763E-B898-436D-883D-03711491D54A}" type="datetimeFigureOut">
               <a:rPr lang="en-US" smtClean="0"/>
-              <a:t>1/10/2020</a:t>
+              <a:t>5/4/2020</a:t>
             </a:fld>
             <a:endParaRPr lang="en-US"/>
           </a:p>
@@ -32110,7 +32106,7 @@
           <a:p>
             <a:fld id="{5958763E-B898-436D-883D-03711491D54A}" type="datetimeFigureOut">
               <a:rPr lang="en-US" smtClean="0"/>
-              <a:t>1/10/2020</a:t>
+              <a:t>5/4/2020</a:t>
             </a:fld>
             <a:endParaRPr lang="en-US"/>
           </a:p>
@@ -32452,7 +32448,7 @@
           <a:p>
             <a:fld id="{5958763E-B898-436D-883D-03711491D54A}" type="datetimeFigureOut">
               <a:rPr lang="en-US" smtClean="0"/>
-              <a:t>1/10/2020</a:t>
+              <a:t>5/4/2020</a:t>
             </a:fld>
             <a:endParaRPr lang="en-US"/>
           </a:p>
@@ -32689,7 +32685,7 @@
           <a:p>
             <a:fld id="{5958763E-B898-436D-883D-03711491D54A}" type="datetimeFigureOut">
               <a:rPr lang="en-US" smtClean="0"/>
-              <a:t>1/10/2020</a:t>
+              <a:t>5/4/2020</a:t>
             </a:fld>
             <a:endParaRPr lang="en-US"/>
           </a:p>
@@ -32940,7 +32936,7 @@
           <a:p>
             <a:fld id="{5958763E-B898-436D-883D-03711491D54A}" type="datetimeFigureOut">
               <a:rPr lang="en-US" smtClean="0"/>
-              <a:t>1/10/2020</a:t>
+              <a:t>5/4/2020</a:t>
             </a:fld>
             <a:endParaRPr lang="en-US"/>
           </a:p>
@@ -36998,48 +36994,15 @@
           </a:bodyPr>
           <a:lstStyle/>
           <a:p>
-            <a:r>
-              <a:rPr lang="en-US" sz="3200" dirty="0" smtClean="0"/>
-              <a:t>The server handles communication from the front-end via HTTP – </a:t>
-            </a:r>
-            <a:r>
-              <a:rPr lang="en-US" sz="3200" b="1" dirty="0" err="1" smtClean="0"/>
-              <a:t>H</a:t>
-            </a:r>
-            <a:r>
-              <a:rPr lang="en-US" sz="3200" dirty="0" err="1" smtClean="0"/>
-              <a:t>yper</a:t>
-            </a:r>
-            <a:r>
-              <a:rPr lang="en-US" sz="3200" b="1" dirty="0" err="1"/>
-              <a:t>T</a:t>
-            </a:r>
-            <a:r>
-              <a:rPr lang="en-US" sz="3200" dirty="0" err="1" smtClean="0"/>
-              <a:t>ext</a:t>
-            </a:r>
-            <a:r>
-              <a:rPr lang="en-US" sz="3200" dirty="0" smtClean="0"/>
-              <a:t> </a:t>
-            </a:r>
-            <a:r>
-              <a:rPr lang="en-US" sz="3200" b="1" dirty="0" smtClean="0"/>
-              <a:t>T</a:t>
-            </a:r>
-            <a:r>
-              <a:rPr lang="en-US" sz="3200" dirty="0" smtClean="0"/>
-              <a:t>ransfer </a:t>
-            </a:r>
-            <a:r>
-              <a:rPr lang="en-US" sz="3200" b="1" dirty="0" smtClean="0"/>
-              <a:t>P</a:t>
-            </a:r>
-            <a:r>
-              <a:rPr lang="en-US" sz="3200" dirty="0" smtClean="0"/>
-              <a:t>rotocol</a:t>
-            </a:r>
-          </a:p>
-          <a:p>
+            <a:pPr marL="57150" indent="0">
+              <a:buNone/>
+            </a:pPr>
+            <a:endParaRPr lang="en-US" sz="3200" smtClean="0"/>
+          </a:p>
+          <a:p>
+            <a:pPr marL="57150" indent="0">
+              <a:buNone/>
+            </a:pPr>
             <a:endParaRPr lang="en-US" sz="3200" dirty="0" smtClean="0"/>
           </a:p>
           <a:p>

</xml_diff>